<commit_message>
Finish draft of part 1 write-up
</commit_message>
<xml_diff>
--- a/ppt/medium.pptx
+++ b/ppt/medium.pptx
@@ -16,6 +16,7 @@
     <p:sldId id="265" r:id="rId10"/>
     <p:sldId id="266" r:id="rId11"/>
     <p:sldId id="269" r:id="rId12"/>
+    <p:sldId id="270" r:id="rId13"/>
   </p:sldIdLst>
   <p:sldSz cx="12192000" cy="6858000"/>
   <p:notesSz cx="6858000" cy="9144000"/>
@@ -3153,7 +3154,7 @@
         </p:nvCxnSpPr>
         <p:spPr>
           <a:xfrm flipV="1">
-            <a:off x="5978769" y="1127509"/>
+            <a:off x="6004169" y="1127509"/>
             <a:ext cx="0" cy="462224"/>
           </a:xfrm>
           <a:prstGeom prst="straightConnector1">
@@ -3189,7 +3190,7 @@
         </p:nvSpPr>
         <p:spPr>
           <a:xfrm>
-            <a:off x="5059231" y="759440"/>
+            <a:off x="5084631" y="759440"/>
             <a:ext cx="1846980" cy="369332"/>
           </a:xfrm>
           <a:prstGeom prst="rect">
@@ -3583,6 +3584,116 @@
           <a:chExt cx="0" cy="0"/>
         </a:xfrm>
       </p:grpSpPr>
+      <p:graphicFrame>
+        <p:nvGraphicFramePr>
+          <p:cNvPr id="14" name="Table 13"/>
+          <p:cNvGraphicFramePr>
+            <a:graphicFrameLocks noGrp="1"/>
+          </p:cNvGraphicFramePr>
+          <p:nvPr>
+            <p:extLst>
+              <p:ext uri="{D42A27DB-BD31-4B8C-83A1-F6EECF244321}">
+                <p14:modId xmlns:p14="http://schemas.microsoft.com/office/powerpoint/2010/main" val="111013852"/>
+              </p:ext>
+            </p:extLst>
+          </p:nvPr>
+        </p:nvGraphicFramePr>
+        <p:xfrm>
+          <a:off x="191867" y="3619557"/>
+          <a:ext cx="11796933" cy="2184390"/>
+        </p:xfrm>
+        <a:graphic>
+          <a:graphicData uri="http://schemas.openxmlformats.org/drawingml/2006/table">
+            <a:tbl>
+              <a:tblPr firstRow="1" bandRow="1">
+                <a:tableStyleId>{5940675A-B579-460E-94D1-54222C63F5DA}</a:tableStyleId>
+              </a:tblPr>
+              <a:tblGrid>
+                <a:gridCol w="4779837"/>
+                <a:gridCol w="7017096"/>
+              </a:tblGrid>
+              <a:tr h="721450">
+                <a:tc>
+                  <a:txBody>
+                    <a:bodyPr/>
+                    <a:lstStyle/>
+                    <a:p>
+                      <a:endParaRPr lang="en-US"/>
+                    </a:p>
+                  </a:txBody>
+                  <a:tcPr>
+                    <a:solidFill>
+                      <a:schemeClr val="bg2"/>
+                    </a:solidFill>
+                  </a:tcPr>
+                </a:tc>
+                <a:tc>
+                  <a:txBody>
+                    <a:bodyPr/>
+                    <a:lstStyle/>
+                    <a:p>
+                      <a:endParaRPr lang="en-US"/>
+                    </a:p>
+                  </a:txBody>
+                  <a:tcPr/>
+                </a:tc>
+              </a:tr>
+              <a:tr h="731470">
+                <a:tc>
+                  <a:txBody>
+                    <a:bodyPr/>
+                    <a:lstStyle/>
+                    <a:p>
+                      <a:endParaRPr lang="en-US"/>
+                    </a:p>
+                  </a:txBody>
+                  <a:tcPr>
+                    <a:solidFill>
+                      <a:schemeClr val="bg2"/>
+                    </a:solidFill>
+                  </a:tcPr>
+                </a:tc>
+                <a:tc>
+                  <a:txBody>
+                    <a:bodyPr/>
+                    <a:lstStyle/>
+                    <a:p>
+                      <a:endParaRPr lang="en-US"/>
+                    </a:p>
+                  </a:txBody>
+                  <a:tcPr/>
+                </a:tc>
+              </a:tr>
+              <a:tr h="731470">
+                <a:tc>
+                  <a:txBody>
+                    <a:bodyPr/>
+                    <a:lstStyle/>
+                    <a:p>
+                      <a:endParaRPr lang="en-US"/>
+                    </a:p>
+                  </a:txBody>
+                  <a:tcPr>
+                    <a:solidFill>
+                      <a:schemeClr val="bg2"/>
+                    </a:solidFill>
+                  </a:tcPr>
+                </a:tc>
+                <a:tc>
+                  <a:txBody>
+                    <a:bodyPr/>
+                    <a:lstStyle/>
+                    <a:p>
+                      <a:endParaRPr lang="en-US"/>
+                    </a:p>
+                  </a:txBody>
+                  <a:tcPr/>
+                </a:tc>
+              </a:tr>
+            </a:tbl>
+          </a:graphicData>
+        </a:graphic>
+      </p:graphicFrame>
       <p:pic>
         <p:nvPicPr>
           <p:cNvPr id="6" name="Picture 5"/>
@@ -3689,13 +3800,13 @@
               </a:ext>
             </a:extLst>
           </a:blip>
-          <a:srcRect r="50049"/>
+          <a:srcRect l="-1" r="35300"/>
           <a:stretch/>
         </p:blipFill>
         <p:spPr>
           <a:xfrm>
             <a:off x="8526379" y="5026606"/>
-            <a:ext cx="1049421" cy="777342"/>
+            <a:ext cx="1359301" cy="777342"/>
           </a:xfrm>
           <a:prstGeom prst="rect">
             <a:avLst/>
@@ -3791,7 +3902,7 @@
       </p:pic>
       <p:pic>
         <p:nvPicPr>
-          <p:cNvPr id="23" name="Picture 22"/>
+          <p:cNvPr id="4" name="Picture 3"/>
           <p:cNvPicPr>
             <a:picLocks noChangeAspect="1"/>
           </p:cNvPicPr>
@@ -3811,8 +3922,8 @@
         </p:blipFill>
         <p:spPr>
           <a:xfrm>
-            <a:off x="4623942" y="3678827"/>
-            <a:ext cx="441194" cy="630277"/>
+            <a:off x="258932" y="2062881"/>
+            <a:ext cx="6155710" cy="630277"/>
           </a:xfrm>
           <a:prstGeom prst="rect">
             <a:avLst/>
@@ -3821,67 +3932,7 @@
       </p:pic>
       <p:pic>
         <p:nvPicPr>
-          <p:cNvPr id="26" name="Picture 25"/>
-          <p:cNvPicPr>
-            <a:picLocks noChangeAspect="1"/>
-          </p:cNvPicPr>
-          <p:nvPr/>
-        </p:nvPicPr>
-        <p:blipFill>
-          <a:blip r:embed="rId9">
-            <a:extLst>
-              <a:ext uri="{28A0092B-C50C-407E-A947-70E740481C1C}">
-                <a14:useLocalDpi xmlns:a14="http://schemas.microsoft.com/office/drawing/2010/main" val="0"/>
-              </a:ext>
-            </a:extLst>
-          </a:blip>
-          <a:stretch>
-            <a:fillRect/>
-          </a:stretch>
-        </p:blipFill>
-        <p:spPr>
-          <a:xfrm>
-            <a:off x="4623942" y="4400151"/>
-            <a:ext cx="441194" cy="630277"/>
-          </a:xfrm>
-          <a:prstGeom prst="rect">
-            <a:avLst/>
-          </a:prstGeom>
-        </p:spPr>
-      </p:pic>
-      <p:pic>
-        <p:nvPicPr>
-          <p:cNvPr id="27" name="Picture 26"/>
-          <p:cNvPicPr>
-            <a:picLocks noChangeAspect="1"/>
-          </p:cNvPicPr>
-          <p:nvPr/>
-        </p:nvPicPr>
-        <p:blipFill>
-          <a:blip r:embed="rId9">
-            <a:extLst>
-              <a:ext uri="{28A0092B-C50C-407E-A947-70E740481C1C}">
-                <a14:useLocalDpi xmlns:a14="http://schemas.microsoft.com/office/drawing/2010/main" val="0"/>
-              </a:ext>
-            </a:extLst>
-          </a:blip>
-          <a:stretch>
-            <a:fillRect/>
-          </a:stretch>
-        </p:blipFill>
-        <p:spPr>
-          <a:xfrm>
-            <a:off x="4622012" y="5106844"/>
-            <a:ext cx="441194" cy="630277"/>
-          </a:xfrm>
-          <a:prstGeom prst="rect">
-            <a:avLst/>
-          </a:prstGeom>
-        </p:spPr>
-      </p:pic>
-      <p:pic>
-        <p:nvPicPr>
-          <p:cNvPr id="4" name="Picture 3"/>
+          <p:cNvPr id="5" name="Picture 4"/>
           <p:cNvPicPr>
             <a:picLocks noChangeAspect="1"/>
           </p:cNvPicPr>
@@ -3901,8 +3952,8 @@
         </p:blipFill>
         <p:spPr>
           <a:xfrm>
-            <a:off x="258932" y="2062881"/>
-            <a:ext cx="6155710" cy="630277"/>
+            <a:off x="258932" y="2876132"/>
+            <a:ext cx="1039958" cy="504222"/>
           </a:xfrm>
           <a:prstGeom prst="rect">
             <a:avLst/>
@@ -3911,13 +3962,13 @@
       </p:pic>
       <p:pic>
         <p:nvPicPr>
-          <p:cNvPr id="5" name="Picture 4"/>
+          <p:cNvPr id="13" name="Picture 12"/>
           <p:cNvPicPr>
             <a:picLocks noChangeAspect="1"/>
           </p:cNvPicPr>
           <p:nvPr/>
         </p:nvPicPr>
-        <p:blipFill>
+        <p:blipFill rotWithShape="1">
           <a:blip r:embed="rId11">
             <a:extLst>
               <a:ext uri="{28A0092B-C50C-407E-A947-70E740481C1C}">
@@ -3925,90 +3976,13 @@
               </a:ext>
             </a:extLst>
           </a:blip>
-          <a:stretch>
-            <a:fillRect/>
-          </a:stretch>
+          <a:srcRect l="36469"/>
+          <a:stretch/>
         </p:blipFill>
         <p:spPr>
           <a:xfrm>
-            <a:off x="258932" y="2876132"/>
-            <a:ext cx="1039958" cy="504222"/>
-          </a:xfrm>
-          <a:prstGeom prst="rect">
-            <a:avLst/>
-          </a:prstGeom>
-        </p:spPr>
-      </p:pic>
-      <p:sp>
-        <p:nvSpPr>
-          <p:cNvPr id="10" name="Rectangle 9"/>
-          <p:cNvSpPr/>
-          <p:nvPr/>
-        </p:nvSpPr>
-        <p:spPr>
-          <a:xfrm>
-            <a:off x="185298" y="3582776"/>
-            <a:ext cx="11676502" cy="2221171"/>
-          </a:xfrm>
-          <a:prstGeom prst="rect">
-            <a:avLst/>
-          </a:prstGeom>
-          <a:noFill/>
-          <a:ln>
-            <a:solidFill>
-              <a:schemeClr val="tx1"/>
-            </a:solidFill>
-          </a:ln>
-        </p:spPr>
-        <p:style>
-          <a:lnRef idx="2">
-            <a:schemeClr val="accent1">
-              <a:shade val="50000"/>
-            </a:schemeClr>
-          </a:lnRef>
-          <a:fillRef idx="1">
-            <a:schemeClr val="accent1"/>
-          </a:fillRef>
-          <a:effectRef idx="0">
-            <a:schemeClr val="accent1"/>
-          </a:effectRef>
-          <a:fontRef idx="minor">
-            <a:schemeClr val="lt1"/>
-          </a:fontRef>
-        </p:style>
-        <p:txBody>
-          <a:bodyPr rtlCol="0" anchor="ctr"/>
-          <a:lstStyle/>
-          <a:p>
-            <a:pPr algn="ctr"/>
-            <a:endParaRPr lang="en-US"/>
-          </a:p>
-        </p:txBody>
-      </p:sp>
-      <p:pic>
-        <p:nvPicPr>
-          <p:cNvPr id="13" name="Picture 12"/>
-          <p:cNvPicPr>
-            <a:picLocks noChangeAspect="1"/>
-          </p:cNvPicPr>
-          <p:nvPr/>
-        </p:nvPicPr>
-        <p:blipFill>
-          <a:blip r:embed="rId12">
-            <a:extLst>
-              <a:ext uri="{28A0092B-C50C-407E-A947-70E740481C1C}">
-                <a14:useLocalDpi xmlns:a14="http://schemas.microsoft.com/office/drawing/2010/main" val="0"/>
-              </a:ext>
-            </a:extLst>
-          </a:blip>
-          <a:stretch>
-            <a:fillRect/>
-          </a:stretch>
-        </p:blipFill>
-        <p:spPr>
-          <a:xfrm>
-            <a:off x="10604539" y="5003782"/>
-            <a:ext cx="1149092" cy="751743"/>
+            <a:off x="11023599" y="5003782"/>
+            <a:ext cx="730031" cy="751743"/>
           </a:xfrm>
           <a:prstGeom prst="rect">
             <a:avLst/>
@@ -4019,6 +3993,43 @@
     <p:extLst>
       <p:ext uri="{BB962C8B-B14F-4D97-AF65-F5344CB8AC3E}">
         <p14:creationId xmlns:p14="http://schemas.microsoft.com/office/powerpoint/2010/main" val="894908132"/>
+      </p:ext>
+    </p:extLst>
+  </p:cSld>
+  <p:clrMapOvr>
+    <a:masterClrMapping/>
+  </p:clrMapOvr>
+  <p:timing>
+    <p:tnLst>
+      <p:par>
+        <p:cTn id="1" dur="indefinite" restart="never" nodeType="tmRoot"/>
+      </p:par>
+    </p:tnLst>
+  </p:timing>
+</p:sld>
+</file>
+
+<file path=ppt/slides/slide12.xml><?xml version="1.0" encoding="utf-8"?>
+<p:sld xmlns:a="http://schemas.openxmlformats.org/drawingml/2006/main" xmlns:r="http://schemas.openxmlformats.org/officeDocument/2006/relationships" xmlns:p="http://schemas.openxmlformats.org/presentationml/2006/main">
+  <p:cSld>
+    <p:spTree>
+      <p:nvGrpSpPr>
+        <p:cNvPr id="1" name=""/>
+        <p:cNvGrpSpPr/>
+        <p:nvPr/>
+      </p:nvGrpSpPr>
+      <p:grpSpPr>
+        <a:xfrm>
+          <a:off x="0" y="0"/>
+          <a:ext cx="0" cy="0"/>
+          <a:chOff x="0" y="0"/>
+          <a:chExt cx="0" cy="0"/>
+        </a:xfrm>
+      </p:grpSpPr>
+    </p:spTree>
+    <p:extLst>
+      <p:ext uri="{BB962C8B-B14F-4D97-AF65-F5344CB8AC3E}">
+        <p14:creationId xmlns:p14="http://schemas.microsoft.com/office/powerpoint/2010/main" val="1817667012"/>
       </p:ext>
     </p:extLst>
   </p:cSld>
@@ -4421,8 +4432,8 @@
         </p:blipFill>
         <p:spPr>
           <a:xfrm>
-            <a:off x="2889162" y="2416697"/>
-            <a:ext cx="2701332" cy="1765344"/>
+            <a:off x="2881796" y="2379824"/>
+            <a:ext cx="2736456" cy="1788298"/>
           </a:xfrm>
           <a:prstGeom prst="rect">
             <a:avLst/>
@@ -4451,7 +4462,7 @@
         </p:blipFill>
         <p:spPr>
           <a:xfrm>
-            <a:off x="408304" y="2451048"/>
+            <a:off x="408304" y="2440888"/>
             <a:ext cx="1690695" cy="1143005"/>
           </a:xfrm>
           <a:prstGeom prst="rect">
@@ -4467,7 +4478,7 @@
         </p:nvSpPr>
         <p:spPr>
           <a:xfrm>
-            <a:off x="2222776" y="3180574"/>
+            <a:off x="2284119" y="2527880"/>
             <a:ext cx="542611" cy="371789"/>
           </a:xfrm>
           <a:prstGeom prst="rightArrow">
@@ -4515,7 +4526,7 @@
         </p:nvSpPr>
         <p:spPr>
           <a:xfrm>
-            <a:off x="5714271" y="3180573"/>
+            <a:off x="5714631" y="2527880"/>
             <a:ext cx="542611" cy="371789"/>
           </a:xfrm>
           <a:prstGeom prst="rightArrow">
@@ -4713,98 +4724,8 @@
         </p:blipFill>
         <p:spPr>
           <a:xfrm>
-            <a:off x="4592513" y="989003"/>
-            <a:ext cx="829902" cy="609460"/>
-          </a:xfrm>
-          <a:prstGeom prst="rect">
-            <a:avLst/>
-          </a:prstGeom>
-        </p:spPr>
-      </p:pic>
-      <p:pic>
-        <p:nvPicPr>
-          <p:cNvPr id="17" name="Picture 16"/>
-          <p:cNvPicPr>
-            <a:picLocks noChangeAspect="1"/>
-          </p:cNvPicPr>
-          <p:nvPr/>
-        </p:nvPicPr>
-        <p:blipFill>
-          <a:blip r:embed="rId6">
-            <a:extLst>
-              <a:ext uri="{28A0092B-C50C-407E-A947-70E740481C1C}">
-                <a14:useLocalDpi xmlns:a14="http://schemas.microsoft.com/office/drawing/2010/main" val="0"/>
-              </a:ext>
-            </a:extLst>
-          </a:blip>
-          <a:stretch>
-            <a:fillRect/>
-          </a:stretch>
-        </p:blipFill>
-        <p:spPr>
-          <a:xfrm>
-            <a:off x="8245576" y="5396659"/>
-            <a:ext cx="823418" cy="609459"/>
-          </a:xfrm>
-          <a:prstGeom prst="rect">
-            <a:avLst/>
-          </a:prstGeom>
-        </p:spPr>
-      </p:pic>
-      <p:pic>
-        <p:nvPicPr>
-          <p:cNvPr id="18" name="Picture 17"/>
-          <p:cNvPicPr>
-            <a:picLocks noChangeAspect="1"/>
-          </p:cNvPicPr>
-          <p:nvPr/>
-        </p:nvPicPr>
-        <p:blipFill>
-          <a:blip r:embed="rId7">
-            <a:extLst>
-              <a:ext uri="{28A0092B-C50C-407E-A947-70E740481C1C}">
-                <a14:useLocalDpi xmlns:a14="http://schemas.microsoft.com/office/drawing/2010/main" val="0"/>
-              </a:ext>
-            </a:extLst>
-          </a:blip>
-          <a:stretch>
-            <a:fillRect/>
-          </a:stretch>
-        </p:blipFill>
-        <p:spPr>
-          <a:xfrm>
-            <a:off x="5620474" y="5396659"/>
-            <a:ext cx="1141116" cy="609460"/>
-          </a:xfrm>
-          <a:prstGeom prst="rect">
-            <a:avLst/>
-          </a:prstGeom>
-        </p:spPr>
-      </p:pic>
-      <p:pic>
-        <p:nvPicPr>
-          <p:cNvPr id="19" name="Picture 18"/>
-          <p:cNvPicPr>
-            <a:picLocks noChangeAspect="1"/>
-          </p:cNvPicPr>
-          <p:nvPr/>
-        </p:nvPicPr>
-        <p:blipFill>
-          <a:blip r:embed="rId8">
-            <a:extLst>
-              <a:ext uri="{28A0092B-C50C-407E-A947-70E740481C1C}">
-                <a14:useLocalDpi xmlns:a14="http://schemas.microsoft.com/office/drawing/2010/main" val="0"/>
-              </a:ext>
-            </a:extLst>
-          </a:blip>
-          <a:stretch>
-            <a:fillRect/>
-          </a:stretch>
-        </p:blipFill>
-        <p:spPr>
-          <a:xfrm>
-            <a:off x="7088632" y="5404170"/>
-            <a:ext cx="829902" cy="609460"/>
+            <a:off x="4592513" y="990189"/>
+            <a:ext cx="829902" cy="607087"/>
           </a:xfrm>
           <a:prstGeom prst="rect">
             <a:avLst/>
@@ -6632,7 +6553,7 @@
         </p:blipFill>
         <p:spPr>
           <a:xfrm>
-            <a:off x="1875473" y="3144775"/>
+            <a:off x="1855153" y="3144775"/>
             <a:ext cx="8484243" cy="2179110"/>
           </a:xfrm>
           <a:prstGeom prst="rect">
@@ -6662,7 +6583,7 @@
         </p:blipFill>
         <p:spPr>
           <a:xfrm>
-            <a:off x="4640683" y="872615"/>
+            <a:off x="4620363" y="872615"/>
             <a:ext cx="972767" cy="720000"/>
           </a:xfrm>
           <a:prstGeom prst="rect">
@@ -6692,7 +6613,7 @@
         </p:blipFill>
         <p:spPr>
           <a:xfrm>
-            <a:off x="2788732" y="872616"/>
+            <a:off x="2768412" y="872616"/>
             <a:ext cx="1348086" cy="720000"/>
           </a:xfrm>
           <a:prstGeom prst="rect">
@@ -6709,13 +6630,13 @@
           <p:nvPr>
             <p:extLst>
               <p:ext uri="{D42A27DB-BD31-4B8C-83A1-F6EECF244321}">
-                <p14:modId xmlns:p14="http://schemas.microsoft.com/office/powerpoint/2010/main" val="965638431"/>
+                <p14:modId xmlns:p14="http://schemas.microsoft.com/office/powerpoint/2010/main" val="669419209"/>
               </p:ext>
             </p:extLst>
           </p:nvPr>
         </p:nvGraphicFramePr>
         <p:xfrm>
-          <a:off x="1875472" y="2844713"/>
+          <a:off x="1855152" y="2844713"/>
           <a:ext cx="8484244" cy="2456492"/>
         </p:xfrm>
         <a:graphic>
@@ -6846,7 +6767,7 @@
         </p:blipFill>
         <p:spPr>
           <a:xfrm>
-            <a:off x="2788732" y="1737490"/>
+            <a:off x="2768412" y="1737490"/>
             <a:ext cx="1742553" cy="720000"/>
           </a:xfrm>
           <a:prstGeom prst="rect">
@@ -6867,7 +6788,7 @@
         </p:nvSpPr>
         <p:spPr>
           <a:xfrm>
-            <a:off x="1968070" y="1084544"/>
+            <a:off x="1947750" y="1084544"/>
             <a:ext cx="972273" cy="369332"/>
           </a:xfrm>
           <a:prstGeom prst="rect">
@@ -6896,8 +6817,8 @@
         </p:nvSpPr>
         <p:spPr>
           <a:xfrm>
-            <a:off x="2" y="3326136"/>
-            <a:ext cx="1615040" cy="923330"/>
+            <a:off x="12139" y="3186475"/>
+            <a:ext cx="1615040" cy="1200329"/>
           </a:xfrm>
           <a:prstGeom prst="rect">
             <a:avLst/>
@@ -6917,7 +6838,7 @@
                   <a:srgbClr val="8A8C8F"/>
                 </a:solidFill>
               </a:rPr>
-              <a:t>combination of </a:t>
+              <a:t>weighted combination of </a:t>
             </a:r>
             <a:r>
               <a:rPr lang="en-US" b="1">
@@ -6951,8 +6872,8 @@
         </p:nvSpPr>
         <p:spPr>
           <a:xfrm>
-            <a:off x="10620146" y="3326136"/>
-            <a:ext cx="1606579" cy="923330"/>
+            <a:off x="10536166" y="3182710"/>
+            <a:ext cx="1676656" cy="1200329"/>
           </a:xfrm>
           <a:prstGeom prst="rect">
             <a:avLst/>
@@ -6972,11 +6893,8 @@
                   <a:srgbClr val="8A8C8F"/>
                 </a:solidFill>
               </a:rPr>
-              <a:t>combination of</a:t>
-            </a:r>
-          </a:p>
-          <a:p>
-            <a:pPr algn="ctr"/>
+              <a:t>weighted combination of </a:t>
+            </a:r>
             <a:r>
               <a:rPr lang="en-US" b="1">
                 <a:solidFill>
@@ -6996,7 +6914,7 @@
         </p:nvSpPr>
         <p:spPr>
           <a:xfrm>
-            <a:off x="1580317" y="3188797"/>
+            <a:off x="1559997" y="3188797"/>
             <a:ext cx="196770" cy="1198008"/>
           </a:xfrm>
           <a:prstGeom prst="leftBrace">
@@ -7039,7 +6957,7 @@
         </p:nvSpPr>
         <p:spPr>
           <a:xfrm flipH="1">
-            <a:off x="10458101" y="3188797"/>
+            <a:off x="10437781" y="3188797"/>
             <a:ext cx="196770" cy="1198008"/>
           </a:xfrm>
           <a:prstGeom prst="leftBrace">
@@ -7096,7 +7014,7 @@
         </p:blipFill>
         <p:spPr>
           <a:xfrm>
-            <a:off x="3260912" y="3941974"/>
+            <a:off x="3240592" y="3941974"/>
             <a:ext cx="201863" cy="396109"/>
           </a:xfrm>
           <a:prstGeom prst="rect">
@@ -7126,7 +7044,7 @@
         </p:blipFill>
         <p:spPr>
           <a:xfrm>
-            <a:off x="2252343" y="3953402"/>
+            <a:off x="2232023" y="3953402"/>
             <a:ext cx="403725" cy="384681"/>
           </a:xfrm>
           <a:prstGeom prst="rect">
@@ -7156,7 +7074,7 @@
         </p:blipFill>
         <p:spPr>
           <a:xfrm>
-            <a:off x="5832876" y="5277586"/>
+            <a:off x="5812556" y="5277586"/>
             <a:ext cx="202044" cy="420253"/>
           </a:xfrm>
           <a:prstGeom prst="rect">
@@ -7172,7 +7090,7 @@
         </p:nvSpPr>
         <p:spPr>
           <a:xfrm>
-            <a:off x="6513509" y="4268634"/>
+            <a:off x="6493189" y="4268634"/>
             <a:ext cx="494528" cy="338843"/>
           </a:xfrm>
           <a:prstGeom prst="rightArrow">
@@ -7234,7 +7152,7 @@
         </p:blipFill>
         <p:spPr>
           <a:xfrm>
-            <a:off x="4594569" y="1744912"/>
+            <a:off x="4574249" y="1744912"/>
             <a:ext cx="532497" cy="469851"/>
           </a:xfrm>
           <a:prstGeom prst="rect">

</xml_diff>

<commit_message>
Remove x ticks for color bars
</commit_message>
<xml_diff>
--- a/ppt/medium.pptx
+++ b/ppt/medium.pptx
@@ -126,6 +126,15 @@
 </p:presentation>
 </file>
 
+<file path=ppt/revisionInfo.xml><?xml version="1.0" encoding="utf-8"?>
+<p1510:revInfo xmlns:a="http://schemas.openxmlformats.org/drawingml/2006/main" xmlns:r="http://schemas.openxmlformats.org/officeDocument/2006/relationships" xmlns:p1510="http://schemas.microsoft.com/office/powerpoint/2015/10/main">
+  <p1510:revLst>
+    <p1510:client id="{29CEC34C-14FA-4C53-AF5D-EAA0048912EF}" v="16" dt="2020-07-15T14:34:06.873"/>
+    <p1510:client id="{F7FB14EB-6E07-45FC-AD3E-E1A19C792B3B}" v="28" dt="2020-07-16T00:11:51.477"/>
+  </p1510:revLst>
+</p1510:revInfo>
+</file>
+
 <file path=ppt/slideLayouts/slideLayout1.xml><?xml version="1.0" encoding="utf-8"?>
 <p:sldLayout xmlns:a="http://schemas.openxmlformats.org/drawingml/2006/main" xmlns:r="http://schemas.openxmlformats.org/officeDocument/2006/relationships" xmlns:p="http://schemas.openxmlformats.org/presentationml/2006/main" type="title" preserve="1">
   <p:cSld name="Title Slide">
@@ -254,7 +263,7 @@
           <a:lstStyle/>
           <a:p>
             <a:fld id="{F33E8F4C-35C8-6A48-B176-7EBD0B6C6C98}" type="datetimeFigureOut">
-              <a:t>7/14/20</a:t>
+              <a:t>7/15/2020</a:t>
             </a:fld>
             <a:endParaRPr lang="en-US"/>
           </a:p>
@@ -420,7 +429,7 @@
           <a:lstStyle/>
           <a:p>
             <a:fld id="{F33E8F4C-35C8-6A48-B176-7EBD0B6C6C98}" type="datetimeFigureOut">
-              <a:t>7/14/20</a:t>
+              <a:t>7/15/2020</a:t>
             </a:fld>
             <a:endParaRPr lang="en-US"/>
           </a:p>
@@ -596,7 +605,7 @@
           <a:lstStyle/>
           <a:p>
             <a:fld id="{F33E8F4C-35C8-6A48-B176-7EBD0B6C6C98}" type="datetimeFigureOut">
-              <a:t>7/14/20</a:t>
+              <a:t>7/15/2020</a:t>
             </a:fld>
             <a:endParaRPr lang="en-US"/>
           </a:p>
@@ -762,7 +771,7 @@
           <a:lstStyle/>
           <a:p>
             <a:fld id="{F33E8F4C-35C8-6A48-B176-7EBD0B6C6C98}" type="datetimeFigureOut">
-              <a:t>7/14/20</a:t>
+              <a:t>7/15/2020</a:t>
             </a:fld>
             <a:endParaRPr lang="en-US"/>
           </a:p>
@@ -1005,7 +1014,7 @@
           <a:lstStyle/>
           <a:p>
             <a:fld id="{F33E8F4C-35C8-6A48-B176-7EBD0B6C6C98}" type="datetimeFigureOut">
-              <a:t>7/14/20</a:t>
+              <a:t>7/15/2020</a:t>
             </a:fld>
             <a:endParaRPr lang="en-US"/>
           </a:p>
@@ -1232,7 +1241,7 @@
           <a:lstStyle/>
           <a:p>
             <a:fld id="{F33E8F4C-35C8-6A48-B176-7EBD0B6C6C98}" type="datetimeFigureOut">
-              <a:t>7/14/20</a:t>
+              <a:t>7/15/2020</a:t>
             </a:fld>
             <a:endParaRPr lang="en-US"/>
           </a:p>
@@ -1594,7 +1603,7 @@
           <a:lstStyle/>
           <a:p>
             <a:fld id="{F33E8F4C-35C8-6A48-B176-7EBD0B6C6C98}" type="datetimeFigureOut">
-              <a:t>7/14/20</a:t>
+              <a:t>7/15/2020</a:t>
             </a:fld>
             <a:endParaRPr lang="en-US"/>
           </a:p>
@@ -1709,7 +1718,7 @@
           <a:lstStyle/>
           <a:p>
             <a:fld id="{F33E8F4C-35C8-6A48-B176-7EBD0B6C6C98}" type="datetimeFigureOut">
-              <a:t>7/14/20</a:t>
+              <a:t>7/15/2020</a:t>
             </a:fld>
             <a:endParaRPr lang="en-US"/>
           </a:p>
@@ -1802,7 +1811,7 @@
           <a:lstStyle/>
           <a:p>
             <a:fld id="{F33E8F4C-35C8-6A48-B176-7EBD0B6C6C98}" type="datetimeFigureOut">
-              <a:t>7/14/20</a:t>
+              <a:t>7/15/2020</a:t>
             </a:fld>
             <a:endParaRPr lang="en-US"/>
           </a:p>
@@ -2075,7 +2084,7 @@
           <a:lstStyle/>
           <a:p>
             <a:fld id="{F33E8F4C-35C8-6A48-B176-7EBD0B6C6C98}" type="datetimeFigureOut">
-              <a:t>7/14/20</a:t>
+              <a:t>7/15/2020</a:t>
             </a:fld>
             <a:endParaRPr lang="en-US"/>
           </a:p>
@@ -2325,7 +2334,7 @@
           <a:lstStyle/>
           <a:p>
             <a:fld id="{F33E8F4C-35C8-6A48-B176-7EBD0B6C6C98}" type="datetimeFigureOut">
-              <a:t>7/14/20</a:t>
+              <a:t>7/15/2020</a:t>
             </a:fld>
             <a:endParaRPr lang="en-US"/>
           </a:p>
@@ -2534,7 +2543,7 @@
           </a:lstStyle>
           <a:p>
             <a:fld id="{F33E8F4C-35C8-6A48-B176-7EBD0B6C6C98}" type="datetimeFigureOut">
-              <a:t>7/14/20</a:t>
+              <a:t>7/15/2020</a:t>
             </a:fld>
             <a:endParaRPr lang="en-US"/>
           </a:p>
@@ -3228,13 +3237,6 @@
   <p:clrMapOvr>
     <a:masterClrMapping/>
   </p:clrMapOvr>
-  <p:timing>
-    <p:tnLst>
-      <p:par>
-        <p:cTn id="1" dur="indefinite" restart="never" nodeType="tmRoot"/>
-      </p:par>
-    </p:tnLst>
-  </p:timing>
 </p:sld>
 </file>
 
@@ -3560,13 +3562,6 @@
   <p:clrMapOvr>
     <a:masterClrMapping/>
   </p:clrMapOvr>
-  <p:timing>
-    <p:tnLst>
-      <p:par>
-        <p:cTn id="1" dur="indefinite" restart="never" nodeType="tmRoot"/>
-      </p:par>
-    </p:tnLst>
-  </p:timing>
 </p:sld>
 </file>
 
@@ -3694,13 +3689,6 @@
   <p:clrMapOvr>
     <a:masterClrMapping/>
   </p:clrMapOvr>
-  <p:timing>
-    <p:tnLst>
-      <p:par>
-        <p:cTn id="1" dur="indefinite" restart="never" nodeType="tmRoot"/>
-      </p:par>
-    </p:tnLst>
-  </p:timing>
 </p:sld>
 </file>
 
@@ -3730,14 +3718,14 @@
           <p:nvPr>
             <p:extLst>
               <p:ext uri="{D42A27DB-BD31-4B8C-83A1-F6EECF244321}">
-                <p14:modId xmlns:p14="http://schemas.microsoft.com/office/powerpoint/2010/main" val="111013852"/>
+                <p14:modId xmlns:p14="http://schemas.microsoft.com/office/powerpoint/2010/main" val="299552809"/>
               </p:ext>
             </p:extLst>
           </p:nvPr>
         </p:nvGraphicFramePr>
         <p:xfrm>
           <a:off x="191867" y="3619557"/>
-          <a:ext cx="11796933" cy="2184390"/>
+          <a:ext cx="11034121" cy="2184390"/>
         </p:xfrm>
         <a:graphic>
           <a:graphicData uri="http://schemas.openxmlformats.org/drawingml/2006/table">
@@ -3746,8 +3734,20 @@
                 <a:tableStyleId>{5940675A-B579-460E-94D1-54222C63F5DA}</a:tableStyleId>
               </a:tblPr>
               <a:tblGrid>
-                <a:gridCol w="4779837"/>
-                <a:gridCol w="7017096"/>
+                <a:gridCol w="4766930">
+                  <a:extLst>
+                    <a:ext uri="{9D8B030D-6E8A-4147-A177-3AD203B41FA5}">
+                      <a16:colId xmlns:a16="http://schemas.microsoft.com/office/drawing/2014/main" val="20000"/>
+                    </a:ext>
+                  </a:extLst>
+                </a:gridCol>
+                <a:gridCol w="6267191">
+                  <a:extLst>
+                    <a:ext uri="{9D8B030D-6E8A-4147-A177-3AD203B41FA5}">
+                      <a16:colId xmlns:a16="http://schemas.microsoft.com/office/drawing/2014/main" val="20001"/>
+                    </a:ext>
+                  </a:extLst>
+                </a:gridCol>
               </a:tblGrid>
               <a:tr h="721450">
                 <a:tc>
@@ -3774,6 +3774,11 @@
                   </a:txBody>
                   <a:tcPr/>
                 </a:tc>
+                <a:extLst>
+                  <a:ext uri="{0D108BD9-81ED-4DB2-BD59-A6C34878D82A}">
+                    <a16:rowId xmlns:a16="http://schemas.microsoft.com/office/drawing/2014/main" val="10000"/>
+                  </a:ext>
+                </a:extLst>
               </a:tr>
               <a:tr h="731470">
                 <a:tc>
@@ -3800,6 +3805,11 @@
                   </a:txBody>
                   <a:tcPr/>
                 </a:tc>
+                <a:extLst>
+                  <a:ext uri="{0D108BD9-81ED-4DB2-BD59-A6C34878D82A}">
+                    <a16:rowId xmlns:a16="http://schemas.microsoft.com/office/drawing/2014/main" val="10001"/>
+                  </a:ext>
+                </a:extLst>
               </a:tr>
               <a:tr h="731470">
                 <a:tc>
@@ -3826,6 +3836,11 @@
                   </a:txBody>
                   <a:tcPr/>
                 </a:tc>
+                <a:extLst>
+                  <a:ext uri="{0D108BD9-81ED-4DB2-BD59-A6C34878D82A}">
+                    <a16:rowId xmlns:a16="http://schemas.microsoft.com/office/drawing/2014/main" val="10002"/>
+                  </a:ext>
+                </a:extLst>
               </a:tr>
             </a:tbl>
           </a:graphicData>
@@ -3853,7 +3868,7 @@
         </p:blipFill>
         <p:spPr>
           <a:xfrm>
-            <a:off x="8554352" y="4239970"/>
+            <a:off x="7996143" y="4266552"/>
             <a:ext cx="3116948" cy="757591"/>
           </a:xfrm>
           <a:prstGeom prst="rect">
@@ -3913,7 +3928,7 @@
         </p:blipFill>
         <p:spPr>
           <a:xfrm>
-            <a:off x="5130012" y="4966730"/>
+            <a:off x="5130012" y="5019893"/>
             <a:ext cx="1218536" cy="777342"/>
           </a:xfrm>
           <a:prstGeom prst="rect">
@@ -3942,7 +3957,7 @@
         </p:blipFill>
         <p:spPr>
           <a:xfrm>
-            <a:off x="8526379" y="5026606"/>
+            <a:off x="7932728" y="5035467"/>
             <a:ext cx="1359301" cy="777342"/>
           </a:xfrm>
           <a:prstGeom prst="rect">
@@ -4118,7 +4133,7 @@
         </p:blipFill>
         <p:spPr>
           <a:xfrm>
-            <a:off x="11023599" y="5003782"/>
+            <a:off x="10376785" y="5021503"/>
             <a:ext cx="730031" cy="751743"/>
           </a:xfrm>
           <a:prstGeom prst="rect">
@@ -4136,13 +4151,6 @@
   <p:clrMapOvr>
     <a:masterClrMapping/>
   </p:clrMapOvr>
-  <p:timing>
-    <p:tnLst>
-      <p:par>
-        <p:cTn id="1" dur="indefinite" restart="never" nodeType="tmRoot"/>
-      </p:par>
-    </p:tnLst>
-  </p:timing>
 </p:sld>
 </file>
 
@@ -5115,6 +5123,114 @@
           </a:p>
         </p:txBody>
       </p:sp>
+      <p:sp>
+        <p:nvSpPr>
+          <p:cNvPr id="2" name="Rectangle 1">
+            <a:extLst>
+              <a:ext uri="{FF2B5EF4-FFF2-40B4-BE49-F238E27FC236}">
+                <a16:creationId xmlns:a16="http://schemas.microsoft.com/office/drawing/2014/main" id="{2166CBD4-3C56-4238-B3A8-F371CBD89CD1}"/>
+              </a:ext>
+            </a:extLst>
+          </p:cNvPr>
+          <p:cNvSpPr/>
+          <p:nvPr/>
+        </p:nvSpPr>
+        <p:spPr>
+          <a:xfrm>
+            <a:off x="4667250" y="5172075"/>
+            <a:ext cx="442913" cy="161925"/>
+          </a:xfrm>
+          <a:prstGeom prst="rect">
+            <a:avLst/>
+          </a:prstGeom>
+          <a:solidFill>
+            <a:schemeClr val="bg1"/>
+          </a:solidFill>
+          <a:ln>
+            <a:noFill/>
+          </a:ln>
+        </p:spPr>
+        <p:style>
+          <a:lnRef idx="2">
+            <a:schemeClr val="accent1">
+              <a:shade val="50000"/>
+            </a:schemeClr>
+          </a:lnRef>
+          <a:fillRef idx="1">
+            <a:schemeClr val="accent1"/>
+          </a:fillRef>
+          <a:effectRef idx="0">
+            <a:schemeClr val="accent1"/>
+          </a:effectRef>
+          <a:fontRef idx="minor">
+            <a:schemeClr val="lt1"/>
+          </a:fontRef>
+        </p:style>
+        <p:txBody>
+          <a:bodyPr rtlCol="0" anchor="ctr"/>
+          <a:lstStyle/>
+          <a:p>
+            <a:pPr algn="ctr"/>
+            <a:endParaRPr lang="en-US" dirty="0">
+              <a:cs typeface="Calibri"/>
+            </a:endParaRPr>
+          </a:p>
+        </p:txBody>
+      </p:sp>
+      <p:sp>
+        <p:nvSpPr>
+          <p:cNvPr id="42" name="Rectangle 41">
+            <a:extLst>
+              <a:ext uri="{FF2B5EF4-FFF2-40B4-BE49-F238E27FC236}">
+                <a16:creationId xmlns:a16="http://schemas.microsoft.com/office/drawing/2014/main" id="{CB594831-46D9-4331-9096-137643A2B9C8}"/>
+              </a:ext>
+            </a:extLst>
+          </p:cNvPr>
+          <p:cNvSpPr/>
+          <p:nvPr/>
+        </p:nvSpPr>
+        <p:spPr>
+          <a:xfrm>
+            <a:off x="10239374" y="5195888"/>
+            <a:ext cx="442913" cy="161925"/>
+          </a:xfrm>
+          <a:prstGeom prst="rect">
+            <a:avLst/>
+          </a:prstGeom>
+          <a:solidFill>
+            <a:schemeClr val="bg1"/>
+          </a:solidFill>
+          <a:ln>
+            <a:noFill/>
+          </a:ln>
+        </p:spPr>
+        <p:style>
+          <a:lnRef idx="2">
+            <a:schemeClr val="accent1">
+              <a:shade val="50000"/>
+            </a:schemeClr>
+          </a:lnRef>
+          <a:fillRef idx="1">
+            <a:schemeClr val="accent1"/>
+          </a:fillRef>
+          <a:effectRef idx="0">
+            <a:schemeClr val="accent1"/>
+          </a:effectRef>
+          <a:fontRef idx="minor">
+            <a:schemeClr val="lt1"/>
+          </a:fontRef>
+        </p:style>
+        <p:txBody>
+          <a:bodyPr rtlCol="0" anchor="ctr"/>
+          <a:lstStyle/>
+          <a:p>
+            <a:pPr algn="ctr"/>
+            <a:endParaRPr lang="en-US" dirty="0">
+              <a:cs typeface="Calibri"/>
+            </a:endParaRPr>
+          </a:p>
+        </p:txBody>
+      </p:sp>
     </p:spTree>
     <p:extLst>
       <p:ext uri="{BB962C8B-B14F-4D97-AF65-F5344CB8AC3E}">
@@ -5125,13 +5241,6 @@
   <p:clrMapOvr>
     <a:masterClrMapping/>
   </p:clrMapOvr>
-  <p:timing>
-    <p:tnLst>
-      <p:par>
-        <p:cTn id="1" dur="indefinite" restart="never" nodeType="tmRoot"/>
-      </p:par>
-    </p:tnLst>
-  </p:timing>
 </p:sld>
 </file>
 
@@ -6044,6 +6153,114 @@
           </a:prstGeom>
         </p:spPr>
       </p:pic>
+      <p:sp>
+        <p:nvSpPr>
+          <p:cNvPr id="3" name="Rectangle 2">
+            <a:extLst>
+              <a:ext uri="{FF2B5EF4-FFF2-40B4-BE49-F238E27FC236}">
+                <a16:creationId xmlns:a16="http://schemas.microsoft.com/office/drawing/2014/main" id="{111CF192-83A9-4377-B54B-0278B2CCE201}"/>
+              </a:ext>
+            </a:extLst>
+          </p:cNvPr>
+          <p:cNvSpPr/>
+          <p:nvPr/>
+        </p:nvSpPr>
+        <p:spPr>
+          <a:xfrm>
+            <a:off x="4667250" y="5172075"/>
+            <a:ext cx="442913" cy="161925"/>
+          </a:xfrm>
+          <a:prstGeom prst="rect">
+            <a:avLst/>
+          </a:prstGeom>
+          <a:solidFill>
+            <a:schemeClr val="bg1"/>
+          </a:solidFill>
+          <a:ln>
+            <a:noFill/>
+          </a:ln>
+        </p:spPr>
+        <p:style>
+          <a:lnRef idx="2">
+            <a:schemeClr val="accent1">
+              <a:shade val="50000"/>
+            </a:schemeClr>
+          </a:lnRef>
+          <a:fillRef idx="1">
+            <a:schemeClr val="accent1"/>
+          </a:fillRef>
+          <a:effectRef idx="0">
+            <a:schemeClr val="accent1"/>
+          </a:effectRef>
+          <a:fontRef idx="minor">
+            <a:schemeClr val="lt1"/>
+          </a:fontRef>
+        </p:style>
+        <p:txBody>
+          <a:bodyPr rtlCol="0" anchor="ctr"/>
+          <a:lstStyle/>
+          <a:p>
+            <a:pPr algn="ctr"/>
+            <a:endParaRPr lang="en-US" dirty="0">
+              <a:cs typeface="Calibri"/>
+            </a:endParaRPr>
+          </a:p>
+        </p:txBody>
+      </p:sp>
+      <p:sp>
+        <p:nvSpPr>
+          <p:cNvPr id="18" name="Rectangle 17">
+            <a:extLst>
+              <a:ext uri="{FF2B5EF4-FFF2-40B4-BE49-F238E27FC236}">
+                <a16:creationId xmlns:a16="http://schemas.microsoft.com/office/drawing/2014/main" id="{AA8AE30E-F3B7-48A1-B790-684033D29069}"/>
+              </a:ext>
+            </a:extLst>
+          </p:cNvPr>
+          <p:cNvSpPr/>
+          <p:nvPr/>
+        </p:nvSpPr>
+        <p:spPr>
+          <a:xfrm>
+            <a:off x="10172700" y="5181600"/>
+            <a:ext cx="442913" cy="161925"/>
+          </a:xfrm>
+          <a:prstGeom prst="rect">
+            <a:avLst/>
+          </a:prstGeom>
+          <a:solidFill>
+            <a:schemeClr val="bg1"/>
+          </a:solidFill>
+          <a:ln>
+            <a:noFill/>
+          </a:ln>
+        </p:spPr>
+        <p:style>
+          <a:lnRef idx="2">
+            <a:schemeClr val="accent1">
+              <a:shade val="50000"/>
+            </a:schemeClr>
+          </a:lnRef>
+          <a:fillRef idx="1">
+            <a:schemeClr val="accent1"/>
+          </a:fillRef>
+          <a:effectRef idx="0">
+            <a:schemeClr val="accent1"/>
+          </a:effectRef>
+          <a:fontRef idx="minor">
+            <a:schemeClr val="lt1"/>
+          </a:fontRef>
+        </p:style>
+        <p:txBody>
+          <a:bodyPr rtlCol="0" anchor="ctr"/>
+          <a:lstStyle/>
+          <a:p>
+            <a:pPr algn="ctr"/>
+            <a:endParaRPr lang="en-US" dirty="0">
+              <a:cs typeface="Calibri"/>
+            </a:endParaRPr>
+          </a:p>
+        </p:txBody>
+      </p:sp>
     </p:spTree>
     <p:extLst>
       <p:ext uri="{BB962C8B-B14F-4D97-AF65-F5344CB8AC3E}">
@@ -6054,13 +6271,6 @@
   <p:clrMapOvr>
     <a:masterClrMapping/>
   </p:clrMapOvr>
-  <p:timing>
-    <p:tnLst>
-      <p:par>
-        <p:cTn id="1" dur="indefinite" restart="never" nodeType="tmRoot"/>
-      </p:par>
-    </p:tnLst>
-  </p:timing>
 </p:sld>
 </file>
 
@@ -6959,11 +7169,6 @@
               </a:rPr>
               <a:t> feasible region</a:t>
             </a:r>
-            <a:endParaRPr lang="en-US" sz="1400">
-              <a:solidFill>
-                <a:srgbClr val="3283BB"/>
-              </a:solidFill>
-            </a:endParaRPr>
           </a:p>
         </p:txBody>
       </p:sp>
@@ -7013,11 +7218,6 @@
               </a:rPr>
               <a:t>feasible region</a:t>
             </a:r>
-            <a:endParaRPr lang="en-US" sz="1400">
-              <a:solidFill>
-                <a:srgbClr val="4EAB4A"/>
-              </a:solidFill>
-            </a:endParaRPr>
           </a:p>
         </p:txBody>
       </p:sp>
@@ -7081,6 +7281,114 @@
           </a:prstGeom>
         </p:spPr>
       </p:pic>
+      <p:sp>
+        <p:nvSpPr>
+          <p:cNvPr id="2" name="Rectangle 1">
+            <a:extLst>
+              <a:ext uri="{FF2B5EF4-FFF2-40B4-BE49-F238E27FC236}">
+                <a16:creationId xmlns:a16="http://schemas.microsoft.com/office/drawing/2014/main" id="{782267D9-EFB9-45DA-8D1A-D02698429E7F}"/>
+              </a:ext>
+            </a:extLst>
+          </p:cNvPr>
+          <p:cNvSpPr/>
+          <p:nvPr/>
+        </p:nvSpPr>
+        <p:spPr>
+          <a:xfrm>
+            <a:off x="5772150" y="5238750"/>
+            <a:ext cx="442913" cy="161925"/>
+          </a:xfrm>
+          <a:prstGeom prst="rect">
+            <a:avLst/>
+          </a:prstGeom>
+          <a:solidFill>
+            <a:schemeClr val="bg1"/>
+          </a:solidFill>
+          <a:ln>
+            <a:noFill/>
+          </a:ln>
+        </p:spPr>
+        <p:style>
+          <a:lnRef idx="2">
+            <a:schemeClr val="accent1">
+              <a:shade val="50000"/>
+            </a:schemeClr>
+          </a:lnRef>
+          <a:fillRef idx="1">
+            <a:schemeClr val="accent1"/>
+          </a:fillRef>
+          <a:effectRef idx="0">
+            <a:schemeClr val="accent1"/>
+          </a:effectRef>
+          <a:fontRef idx="minor">
+            <a:schemeClr val="lt1"/>
+          </a:fontRef>
+        </p:style>
+        <p:txBody>
+          <a:bodyPr rtlCol="0" anchor="ctr"/>
+          <a:lstStyle/>
+          <a:p>
+            <a:pPr algn="ctr"/>
+            <a:endParaRPr lang="en-US" dirty="0">
+              <a:cs typeface="Calibri"/>
+            </a:endParaRPr>
+          </a:p>
+        </p:txBody>
+      </p:sp>
+      <p:sp>
+        <p:nvSpPr>
+          <p:cNvPr id="3" name="Rectangle 2">
+            <a:extLst>
+              <a:ext uri="{FF2B5EF4-FFF2-40B4-BE49-F238E27FC236}">
+                <a16:creationId xmlns:a16="http://schemas.microsoft.com/office/drawing/2014/main" id="{8F5809F8-96FA-4CCC-8E34-DF3F11F36BB1}"/>
+              </a:ext>
+            </a:extLst>
+          </p:cNvPr>
+          <p:cNvSpPr/>
+          <p:nvPr/>
+        </p:nvSpPr>
+        <p:spPr>
+          <a:xfrm>
+            <a:off x="11287125" y="5238750"/>
+            <a:ext cx="442913" cy="161925"/>
+          </a:xfrm>
+          <a:prstGeom prst="rect">
+            <a:avLst/>
+          </a:prstGeom>
+          <a:solidFill>
+            <a:schemeClr val="bg1"/>
+          </a:solidFill>
+          <a:ln>
+            <a:noFill/>
+          </a:ln>
+        </p:spPr>
+        <p:style>
+          <a:lnRef idx="2">
+            <a:schemeClr val="accent1">
+              <a:shade val="50000"/>
+            </a:schemeClr>
+          </a:lnRef>
+          <a:fillRef idx="1">
+            <a:schemeClr val="accent1"/>
+          </a:fillRef>
+          <a:effectRef idx="0">
+            <a:schemeClr val="accent1"/>
+          </a:effectRef>
+          <a:fontRef idx="minor">
+            <a:schemeClr val="lt1"/>
+          </a:fontRef>
+        </p:style>
+        <p:txBody>
+          <a:bodyPr rtlCol="0" anchor="ctr"/>
+          <a:lstStyle/>
+          <a:p>
+            <a:pPr algn="ctr"/>
+            <a:endParaRPr lang="en-US" dirty="0">
+              <a:cs typeface="Calibri"/>
+            </a:endParaRPr>
+          </a:p>
+        </p:txBody>
+      </p:sp>
     </p:spTree>
     <p:extLst>
       <p:ext uri="{BB962C8B-B14F-4D97-AF65-F5344CB8AC3E}">
@@ -7091,13 +7399,6 @@
   <p:clrMapOvr>
     <a:masterClrMapping/>
   </p:clrMapOvr>
-  <p:timing>
-    <p:tnLst>
-      <p:par>
-        <p:cTn id="1" dur="indefinite" restart="never" nodeType="tmRoot"/>
-      </p:par>
-    </p:tnLst>
-  </p:timing>
 </p:sld>
 </file>
 
@@ -7498,13 +7799,6 @@
   <p:clrMapOvr>
     <a:masterClrMapping/>
   </p:clrMapOvr>
-  <p:timing>
-    <p:tnLst>
-      <p:par>
-        <p:cTn id="1" dur="indefinite" restart="never" nodeType="tmRoot"/>
-      </p:par>
-    </p:tnLst>
-  </p:timing>
 </p:sld>
 </file>
 
@@ -8173,13 +8467,6 @@
   <p:clrMapOvr>
     <a:masterClrMapping/>
   </p:clrMapOvr>
-  <p:timing>
-    <p:tnLst>
-      <p:par>
-        <p:cTn id="1" dur="indefinite" restart="never" nodeType="tmRoot"/>
-      </p:par>
-    </p:tnLst>
-  </p:timing>
 </p:sld>
 </file>
 
@@ -8790,13 +9077,6 @@
   <p:clrMapOvr>
     <a:masterClrMapping/>
   </p:clrMapOvr>
-  <p:timing>
-    <p:tnLst>
-      <p:par>
-        <p:cTn id="1" dur="indefinite" restart="never" nodeType="tmRoot"/>
-      </p:par>
-    </p:tnLst>
-  </p:timing>
 </p:sld>
 </file>
 
@@ -9133,11 +9413,6 @@
               </a:rPr>
               <a:t> feasible region</a:t>
             </a:r>
-            <a:endParaRPr lang="en-US" sz="1400">
-              <a:solidFill>
-                <a:srgbClr val="26C0D0"/>
-              </a:solidFill>
-            </a:endParaRPr>
           </a:p>
         </p:txBody>
       </p:sp>
@@ -9187,11 +9462,6 @@
               </a:rPr>
               <a:t> feasible region</a:t>
             </a:r>
-            <a:endParaRPr lang="en-US" sz="1400">
-              <a:solidFill>
-                <a:srgbClr val="3283BB"/>
-              </a:solidFill>
-            </a:endParaRPr>
           </a:p>
         </p:txBody>
       </p:sp>
@@ -9205,13 +9475,6 @@
   <p:clrMapOvr>
     <a:masterClrMapping/>
   </p:clrMapOvr>
-  <p:timing>
-    <p:tnLst>
-      <p:par>
-        <p:cTn id="1" dur="indefinite" restart="never" nodeType="tmRoot"/>
-      </p:par>
-    </p:tnLst>
-  </p:timing>
 </p:sld>
 </file>
 
@@ -9338,13 +9601,6 @@
   <p:clrMapOvr>
     <a:masterClrMapping/>
   </p:clrMapOvr>
-  <p:timing>
-    <p:tnLst>
-      <p:par>
-        <p:cTn id="1" dur="indefinite" restart="never" nodeType="tmRoot"/>
-      </p:par>
-    </p:tnLst>
-  </p:timing>
 </p:sld>
 </file>
 
@@ -9613,14 +9869,6 @@
               </a:rPr>
               <a:t>maximize</a:t>
             </a:r>
-            <a:r>
-              <a:rPr lang="en-US">
-                <a:solidFill>
-                  <a:srgbClr val="287BB6"/>
-                </a:solidFill>
-              </a:rPr>
-              <a:t/>
-            </a:r>
             <a:br>
               <a:rPr lang="en-US">
                 <a:solidFill>
@@ -9649,13 +9897,6 @@
   <p:clrMapOvr>
     <a:masterClrMapping/>
   </p:clrMapOvr>
-  <p:timing>
-    <p:tnLst>
-      <p:par>
-        <p:cTn id="1" dur="indefinite" restart="never" nodeType="tmRoot"/>
-      </p:par>
-    </p:tnLst>
-  </p:timing>
 </p:sld>
 </file>
 
@@ -9791,8 +10032,20 @@
                 <a:tableStyleId>{5940675A-B579-460E-94D1-54222C63F5DA}</a:tableStyleId>
               </a:tblPr>
               <a:tblGrid>
-                <a:gridCol w="4965167"/>
-                <a:gridCol w="3519077"/>
+                <a:gridCol w="4965167">
+                  <a:extLst>
+                    <a:ext uri="{9D8B030D-6E8A-4147-A177-3AD203B41FA5}">
+                      <a16:colId xmlns:a16="http://schemas.microsoft.com/office/drawing/2014/main" val="20000"/>
+                    </a:ext>
+                  </a:extLst>
+                </a:gridCol>
+                <a:gridCol w="3519077">
+                  <a:extLst>
+                    <a:ext uri="{9D8B030D-6E8A-4147-A177-3AD203B41FA5}">
+                      <a16:colId xmlns:a16="http://schemas.microsoft.com/office/drawing/2014/main" val="20001"/>
+                    </a:ext>
+                  </a:extLst>
+                </a:gridCol>
               </a:tblGrid>
               <a:tr h="258243">
                 <a:tc>
@@ -9841,6 +10094,11 @@
                     </a:solidFill>
                   </a:tcPr>
                 </a:tc>
+                <a:extLst>
+                  <a:ext uri="{0D108BD9-81ED-4DB2-BD59-A6C34878D82A}">
+                    <a16:rowId xmlns:a16="http://schemas.microsoft.com/office/drawing/2014/main" val="10000"/>
+                  </a:ext>
+                </a:extLst>
               </a:tr>
               <a:tr h="1234205">
                 <a:tc>
@@ -9863,6 +10121,11 @@
                   </a:txBody>
                   <a:tcPr/>
                 </a:tc>
+                <a:extLst>
+                  <a:ext uri="{0D108BD9-81ED-4DB2-BD59-A6C34878D82A}">
+                    <a16:rowId xmlns:a16="http://schemas.microsoft.com/office/drawing/2014/main" val="10001"/>
+                  </a:ext>
+                </a:extLst>
               </a:tr>
               <a:tr h="856527">
                 <a:tc>
@@ -9885,6 +10148,11 @@
                   </a:txBody>
                   <a:tcPr/>
                 </a:tc>
+                <a:extLst>
+                  <a:ext uri="{0D108BD9-81ED-4DB2-BD59-A6C34878D82A}">
+                    <a16:rowId xmlns:a16="http://schemas.microsoft.com/office/drawing/2014/main" val="10002"/>
+                  </a:ext>
+                </a:extLst>
               </a:tr>
             </a:tbl>
           </a:graphicData>
@@ -10315,13 +10583,6 @@
   <p:clrMapOvr>
     <a:masterClrMapping/>
   </p:clrMapOvr>
-  <p:timing>
-    <p:tnLst>
-      <p:par>
-        <p:cTn id="1" dur="indefinite" restart="never" nodeType="tmRoot"/>
-      </p:par>
-    </p:tnLst>
-  </p:timing>
 </p:sld>
 </file>
 
@@ -10475,13 +10736,6 @@
   <p:clrMapOvr>
     <a:masterClrMapping/>
   </p:clrMapOvr>
-  <p:timing>
-    <p:tnLst>
-      <p:par>
-        <p:cTn id="1" dur="indefinite" restart="never" nodeType="tmRoot"/>
-      </p:par>
-    </p:tnLst>
-  </p:timing>
 </p:sld>
 </file>
 

</xml_diff>